<commit_message>
updated PP with contact info
</commit_message>
<xml_diff>
--- a/What’s New in C#7.pptx
+++ b/What’s New in C#7.pptx
@@ -10,6 +10,7 @@
     <p:sldId id="258" r:id="rId4"/>
     <p:sldId id="259" r:id="rId5"/>
     <p:sldId id="260" r:id="rId6"/>
+    <p:sldId id="261" r:id="rId7"/>
   </p:sldIdLst>
   <p:sldSz cx="12192000" cy="6858000"/>
   <p:notesSz cx="6858000" cy="9144000"/>
@@ -3039,9 +3040,10 @@
           <a:lstStyle/>
           <a:p>
             <a:r>
-              <a:rPr lang="en-US" dirty="0"/>
-              <a:t>Timeline</a:t>
-            </a:r>
+              <a:rPr lang="en-US" dirty="0" smtClean="0"/>
+              <a:t>Timeline (very high level)</a:t>
+            </a:r>
+            <a:endParaRPr lang="en-US" dirty="0"/>
           </a:p>
         </p:txBody>
       </p:sp>
@@ -3459,7 +3461,12 @@
             <p:ph idx="1"/>
           </p:nvPr>
         </p:nvSpPr>
-        <p:spPr/>
+        <p:spPr>
+          <a:xfrm>
+            <a:off x="838200" y="1825625"/>
+            <a:ext cx="10515600" cy="1856690"/>
+          </a:xfrm>
+        </p:spPr>
         <p:txBody>
           <a:bodyPr/>
           <a:lstStyle/>
@@ -3508,6 +3515,127 @@
     <p:extLst>
       <p:ext uri="{BB962C8B-B14F-4D97-AF65-F5344CB8AC3E}">
         <p14:creationId xmlns:p14="http://schemas.microsoft.com/office/powerpoint/2010/main" val="1102832386"/>
+      </p:ext>
+    </p:extLst>
+  </p:cSld>
+  <p:clrMapOvr>
+    <a:masterClrMapping/>
+  </p:clrMapOvr>
+</p:sld>
+</file>
+
+<file path=ppt/slides/slide6.xml><?xml version="1.0" encoding="utf-8"?>
+<p:sld xmlns:a="http://schemas.openxmlformats.org/drawingml/2006/main" xmlns:r="http://schemas.openxmlformats.org/officeDocument/2006/relationships" xmlns:p="http://schemas.openxmlformats.org/presentationml/2006/main">
+  <p:cSld>
+    <p:spTree>
+      <p:nvGrpSpPr>
+        <p:cNvPr id="1" name=""/>
+        <p:cNvGrpSpPr/>
+        <p:nvPr/>
+      </p:nvGrpSpPr>
+      <p:grpSpPr>
+        <a:xfrm>
+          <a:off x="0" y="0"/>
+          <a:ext cx="0" cy="0"/>
+          <a:chOff x="0" y="0"/>
+          <a:chExt cx="0" cy="0"/>
+        </a:xfrm>
+      </p:grpSpPr>
+      <p:sp>
+        <p:nvSpPr>
+          <p:cNvPr id="2" name="Title 1"/>
+          <p:cNvSpPr>
+            <a:spLocks noGrp="1"/>
+          </p:cNvSpPr>
+          <p:nvPr>
+            <p:ph type="title"/>
+          </p:nvPr>
+        </p:nvSpPr>
+        <p:spPr/>
+        <p:txBody>
+          <a:bodyPr/>
+          <a:lstStyle/>
+          <a:p>
+            <a:r>
+              <a:rPr lang="en-US" dirty="0" smtClean="0"/>
+              <a:t>Where to find these sample code</a:t>
+            </a:r>
+            <a:endParaRPr lang="en-US" dirty="0"/>
+          </a:p>
+        </p:txBody>
+      </p:sp>
+      <p:sp>
+        <p:nvSpPr>
+          <p:cNvPr id="3" name="Content Placeholder 2"/>
+          <p:cNvSpPr>
+            <a:spLocks noGrp="1"/>
+          </p:cNvSpPr>
+          <p:nvPr>
+            <p:ph idx="1"/>
+          </p:nvPr>
+        </p:nvSpPr>
+        <p:spPr/>
+        <p:txBody>
+          <a:bodyPr/>
+          <a:lstStyle/>
+          <a:p>
+            <a:r>
+              <a:rPr lang="en-US" dirty="0" err="1" smtClean="0"/>
+              <a:t>Git</a:t>
+            </a:r>
+            <a:endParaRPr lang="en-US" dirty="0" smtClean="0"/>
+          </a:p>
+          <a:p>
+            <a:pPr lvl="1"/>
+            <a:r>
+              <a:rPr lang="en-US" dirty="0" smtClean="0">
+                <a:hlinkClick r:id="rId2"/>
+              </a:rPr>
+              <a:t>https</a:t>
+            </a:r>
+            <a:r>
+              <a:rPr lang="en-US" dirty="0">
+                <a:hlinkClick r:id="rId2"/>
+              </a:rPr>
+              <a:t>://</a:t>
+            </a:r>
+            <a:r>
+              <a:rPr lang="en-US" dirty="0" smtClean="0">
+                <a:hlinkClick r:id="rId2"/>
+              </a:rPr>
+              <a:t>github.com/reazhaq/CSharp7.git</a:t>
+            </a:r>
+            <a:endParaRPr lang="en-US" dirty="0" smtClean="0"/>
+          </a:p>
+          <a:p>
+            <a:endParaRPr lang="en-US" dirty="0" smtClean="0"/>
+          </a:p>
+          <a:p>
+            <a:r>
+              <a:rPr lang="en-US" dirty="0" smtClean="0"/>
+              <a:t>Email me</a:t>
+            </a:r>
+          </a:p>
+          <a:p>
+            <a:pPr lvl="1"/>
+            <a:r>
+              <a:rPr lang="en-US" dirty="0" smtClean="0">
+                <a:hlinkClick r:id="rId3"/>
+              </a:rPr>
+              <a:t>reaz@bluebonnetsoftware.com</a:t>
+            </a:r>
+            <a:endParaRPr lang="en-US" dirty="0" smtClean="0"/>
+          </a:p>
+          <a:p>
+            <a:pPr lvl="1"/>
+            <a:endParaRPr lang="en-US" dirty="0"/>
+          </a:p>
+        </p:txBody>
+      </p:sp>
+    </p:spTree>
+    <p:extLst>
+      <p:ext uri="{BB962C8B-B14F-4D97-AF65-F5344CB8AC3E}">
+        <p14:creationId xmlns:p14="http://schemas.microsoft.com/office/powerpoint/2010/main" val="637905356"/>
       </p:ext>
     </p:extLst>
   </p:cSld>

</xml_diff>

<commit_message>
removed namof operators - looked like it was adding noise formatted non-working code with indentation for better readability added local function alternative Func to calculate Fib
</commit_message>
<xml_diff>
--- a/What’s New in C#7.pptx
+++ b/What’s New in C#7.pptx
@@ -3066,37 +3066,85 @@
           <a:p>
             <a:r>
               <a:rPr lang="en-US" dirty="0"/>
-              <a:t>1.x (2002-2003): first release</a:t>
-            </a:r>
-          </a:p>
-          <a:p>
+              <a:t>1.x </a:t>
+            </a:r>
+            <a:r>
+              <a:rPr lang="en-US" dirty="0" smtClean="0"/>
+              <a:t>(~2002-03</a:t>
+            </a:r>
             <a:r>
               <a:rPr lang="en-US" dirty="0"/>
-              <a:t>2.x (2005): Generics, Nullable types, Anonymous methods, etc.</a:t>
-            </a:r>
-          </a:p>
-          <a:p>
+              <a:t>): first release</a:t>
+            </a:r>
+          </a:p>
+          <a:p>
+            <a:r>
+              <a:rPr lang="en-US" dirty="0" smtClean="0"/>
+              <a:t>2.0 (~2005-06): </a:t>
+            </a:r>
             <a:r>
               <a:rPr lang="en-US" dirty="0"/>
-              <a:t>3.x (2008): Lambda, Extension methods, Anonymous types, Expression tree, Auto-Property, etc.</a:t>
-            </a:r>
-          </a:p>
-          <a:p>
+              <a:t>Generics, Nullable types, Anonymous methods, etc.</a:t>
+            </a:r>
+          </a:p>
+          <a:p>
+            <a:r>
+              <a:rPr lang="en-US" dirty="0" smtClean="0"/>
+              <a:t>3.0 (</a:t>
+            </a:r>
+            <a:r>
+              <a:rPr lang="en-US" dirty="0" smtClean="0"/>
+              <a:t>~20</a:t>
+            </a:r>
+            <a:r>
+              <a:rPr lang="en-US" dirty="0" smtClean="0"/>
+              <a:t>07-08): </a:t>
+            </a:r>
             <a:r>
               <a:rPr lang="en-US" dirty="0"/>
-              <a:t>4.0 (2010): Covariance-Contravariance, Optional Parameters, Dynamic Binding, COM interop, Task, etc.</a:t>
+              <a:t>Lambda, Extension methods, Anonymous types, Expression tree, Auto-Property, etc.</a:t>
             </a:r>
           </a:p>
           <a:p>
             <a:r>
               <a:rPr lang="en-US" dirty="0"/>
-              <a:t>5.0 (2011-12): Async-Await, Caller information</a:t>
-            </a:r>
-          </a:p>
-          <a:p>
+              <a:t>4.0 </a:t>
+            </a:r>
+            <a:r>
+              <a:rPr lang="en-US" dirty="0" smtClean="0"/>
+              <a:t>(~2010</a:t>
+            </a:r>
             <a:r>
               <a:rPr lang="en-US" dirty="0"/>
-              <a:t>6.0 (2014): Null conditional Op, Auto Property initializer, Name Of, Expression body, string interpolation, etc. </a:t>
+              <a:t>): Covariance-Contravariance, Optional Parameters, Dynamic Binding, COM interop, Task, etc.</a:t>
+            </a:r>
+          </a:p>
+          <a:p>
+            <a:r>
+              <a:rPr lang="en-US" dirty="0"/>
+              <a:t>5.0 </a:t>
+            </a:r>
+            <a:r>
+              <a:rPr lang="en-US" dirty="0" smtClean="0"/>
+              <a:t>(~2011-12</a:t>
+            </a:r>
+            <a:r>
+              <a:rPr lang="en-US" dirty="0"/>
+              <a:t>): Async-Await, Caller information</a:t>
+            </a:r>
+          </a:p>
+          <a:p>
+            <a:r>
+              <a:rPr lang="en-US" dirty="0"/>
+              <a:t>6.0 </a:t>
+            </a:r>
+            <a:r>
+              <a:rPr lang="en-US" dirty="0" smtClean="0"/>
+              <a:t>(~2014</a:t>
+            </a:r>
+            <a:r>
+              <a:rPr lang="en-US" dirty="0"/>
+              <a:t>): Null conditional Op, Auto Property initializer, Name Of, Expression body, string interpolation, etc. </a:t>
             </a:r>
           </a:p>
         </p:txBody>
@@ -3165,8 +3213,8 @@
         </p:nvSpPr>
         <p:spPr>
           <a:xfrm>
-            <a:off x="838200" y="1496291"/>
-            <a:ext cx="10515600" cy="4680672"/>
+            <a:off x="838200" y="1512767"/>
+            <a:ext cx="10515600" cy="4459666"/>
           </a:xfrm>
         </p:spPr>
         <p:txBody>
@@ -3213,8 +3261,13 @@
           <a:p>
             <a:r>
               <a:rPr lang="en-US" dirty="0"/>
-              <a:t>Expression Body</a:t>
-            </a:r>
+              <a:t>Expression </a:t>
+            </a:r>
+            <a:r>
+              <a:rPr lang="en-US" dirty="0" smtClean="0"/>
+              <a:t>Body - enhancement</a:t>
+            </a:r>
+            <a:endParaRPr lang="en-US" dirty="0"/>
           </a:p>
           <a:p>
             <a:r>
@@ -3296,49 +3349,82 @@
           <a:p>
             <a:r>
               <a:rPr lang="en-US" dirty="0"/>
-              <a:t>Simplified “throw” – like (</a:t>
-            </a:r>
-            <a:r>
-              <a:rPr lang="en-US"/>
-              <a:t>see example 7)</a:t>
-            </a:r>
-            <a:endParaRPr lang="en-US" dirty="0"/>
+              <a:t>Simplified “throw” – like (see example 7)</a:t>
+            </a:r>
           </a:p>
           <a:p>
             <a:pPr lvl="1"/>
             <a:r>
-              <a:rPr lang="en-US" dirty="0"/>
+              <a:rPr lang="en-US" sz="1400" dirty="0">
+                <a:latin typeface="Consolas" panose="020B0609020204030204" pitchFamily="49" charset="0"/>
+                <a:cs typeface="Consolas" panose="020B0609020204030204" pitchFamily="49" charset="0"/>
+              </a:rPr>
               <a:t>public string Name {</a:t>
             </a:r>
           </a:p>
           <a:p>
-            <a:pPr lvl="2"/>
-            <a:r>
-              <a:rPr lang="en-US" dirty="0"/>
+            <a:pPr marL="914400" lvl="2" indent="0">
+              <a:buNone/>
+            </a:pPr>
+            <a:r>
+              <a:rPr lang="en-US" sz="1400" dirty="0">
+                <a:latin typeface="Consolas" panose="020B0609020204030204" pitchFamily="49" charset="0"/>
+                <a:cs typeface="Consolas" panose="020B0609020204030204" pitchFamily="49" charset="0"/>
+              </a:rPr>
               <a:t>get=&gt;name;</a:t>
             </a:r>
           </a:p>
           <a:p>
-            <a:pPr lvl="2"/>
-            <a:r>
-              <a:rPr lang="en-US" dirty="0"/>
+            <a:pPr marL="914400" lvl="2" indent="0">
+              <a:buNone/>
+            </a:pPr>
+            <a:r>
+              <a:rPr lang="en-US" sz="1400" dirty="0">
+                <a:latin typeface="Consolas" panose="020B0609020204030204" pitchFamily="49" charset="0"/>
+                <a:cs typeface="Consolas" panose="020B0609020204030204" pitchFamily="49" charset="0"/>
+              </a:rPr>
               <a:t>Set=&gt;value ?? throw new </a:t>
             </a:r>
             <a:r>
-              <a:rPr lang="en-US" dirty="0" err="1"/>
+              <a:rPr lang="en-US" sz="1400" dirty="0" err="1">
+                <a:latin typeface="Consolas" panose="020B0609020204030204" pitchFamily="49" charset="0"/>
+                <a:cs typeface="Consolas" panose="020B0609020204030204" pitchFamily="49" charset="0"/>
+              </a:rPr>
               <a:t>ArgumentNull</a:t>
             </a:r>
             <a:r>
-              <a:rPr lang="en-US" dirty="0"/>
+              <a:rPr lang="en-US" sz="1400" dirty="0">
+                <a:latin typeface="Consolas" panose="020B0609020204030204" pitchFamily="49" charset="0"/>
+                <a:cs typeface="Consolas" panose="020B0609020204030204" pitchFamily="49" charset="0"/>
+              </a:rPr>
               <a:t>….</a:t>
             </a:r>
           </a:p>
           <a:p>
+            <a:pPr marL="457200" lvl="1" indent="0">
+              <a:buNone/>
+            </a:pPr>
+            <a:r>
+              <a:rPr lang="en-US" sz="1400" dirty="0" smtClean="0">
+                <a:latin typeface="Consolas" panose="020B0609020204030204" pitchFamily="49" charset="0"/>
+                <a:cs typeface="Consolas" panose="020B0609020204030204" pitchFamily="49" charset="0"/>
+              </a:rPr>
+              <a:t>}</a:t>
+            </a:r>
+          </a:p>
+          <a:p>
             <a:pPr lvl="1"/>
             <a:r>
-              <a:rPr lang="en-US" dirty="0"/>
-              <a:t>}</a:t>
-            </a:r>
+              <a:rPr lang="en-US" sz="1400" dirty="0" smtClean="0">
+                <a:latin typeface="Consolas" panose="020B0609020204030204" pitchFamily="49" charset="0"/>
+                <a:cs typeface="Consolas" panose="020B0609020204030204" pitchFamily="49" charset="0"/>
+              </a:rPr>
+              <a:t>public Foo(string s) =&gt; Blah= new Blah(s ?? throw new …);</a:t>
+            </a:r>
+            <a:endParaRPr lang="en-US" sz="1400" dirty="0">
+              <a:latin typeface="Consolas" panose="020B0609020204030204" pitchFamily="49" charset="0"/>
+              <a:cs typeface="Consolas" panose="020B0609020204030204" pitchFamily="49" charset="0"/>
+            </a:endParaRPr>
           </a:p>
           <a:p>
             <a:r>
@@ -3354,46 +3440,76 @@
           <a:p>
             <a:pPr lvl="1"/>
             <a:r>
-              <a:rPr lang="en-US" dirty="0"/>
+              <a:rPr lang="en-US" sz="1400" dirty="0">
+                <a:latin typeface="Consolas" panose="020B0609020204030204" pitchFamily="49" charset="0"/>
+                <a:cs typeface="Consolas" panose="020B0609020204030204" pitchFamily="49" charset="0"/>
+              </a:rPr>
               <a:t>public Task&lt;</a:t>
             </a:r>
             <a:r>
-              <a:rPr lang="en-US" dirty="0" err="1"/>
+              <a:rPr lang="en-US" sz="1400" dirty="0" err="1">
+                <a:latin typeface="Consolas" panose="020B0609020204030204" pitchFamily="49" charset="0"/>
+                <a:cs typeface="Consolas" panose="020B0609020204030204" pitchFamily="49" charset="0"/>
+              </a:rPr>
               <a:t>int</a:t>
             </a:r>
             <a:r>
-              <a:rPr lang="en-US" dirty="0"/>
+              <a:rPr lang="en-US" sz="1400" dirty="0">
+                <a:latin typeface="Consolas" panose="020B0609020204030204" pitchFamily="49" charset="0"/>
+                <a:cs typeface="Consolas" panose="020B0609020204030204" pitchFamily="49" charset="0"/>
+              </a:rPr>
               <a:t>&gt; DoSomething{ return </a:t>
             </a:r>
             <a:r>
-              <a:rPr lang="en-US" dirty="0" err="1"/>
+              <a:rPr lang="en-US" sz="1400" dirty="0" err="1">
+                <a:latin typeface="Consolas" panose="020B0609020204030204" pitchFamily="49" charset="0"/>
+                <a:cs typeface="Consolas" panose="020B0609020204030204" pitchFamily="49" charset="0"/>
+              </a:rPr>
               <a:t>Task.FromResult</a:t>
             </a:r>
             <a:r>
-              <a:rPr lang="en-US" dirty="0"/>
+              <a:rPr lang="en-US" sz="1400" dirty="0">
+                <a:latin typeface="Consolas" panose="020B0609020204030204" pitchFamily="49" charset="0"/>
+                <a:cs typeface="Consolas" panose="020B0609020204030204" pitchFamily="49" charset="0"/>
+              </a:rPr>
               <a:t>(5); }</a:t>
             </a:r>
           </a:p>
           <a:p>
             <a:pPr lvl="1"/>
             <a:r>
-              <a:rPr lang="en-US" dirty="0"/>
+              <a:rPr lang="en-US" sz="1400" dirty="0">
+                <a:latin typeface="Consolas" panose="020B0609020204030204" pitchFamily="49" charset="0"/>
+                <a:cs typeface="Consolas" panose="020B0609020204030204" pitchFamily="49" charset="0"/>
+              </a:rPr>
               <a:t>Public </a:t>
             </a:r>
             <a:r>
-              <a:rPr lang="en-US" dirty="0" err="1"/>
+              <a:rPr lang="en-US" sz="1400" dirty="0" err="1">
+                <a:latin typeface="Consolas" panose="020B0609020204030204" pitchFamily="49" charset="0"/>
+                <a:cs typeface="Consolas" panose="020B0609020204030204" pitchFamily="49" charset="0"/>
+              </a:rPr>
               <a:t>ValueTask</a:t>
             </a:r>
             <a:r>
-              <a:rPr lang="en-US" dirty="0"/>
+              <a:rPr lang="en-US" sz="1400" dirty="0">
+                <a:latin typeface="Consolas" panose="020B0609020204030204" pitchFamily="49" charset="0"/>
+                <a:cs typeface="Consolas" panose="020B0609020204030204" pitchFamily="49" charset="0"/>
+              </a:rPr>
               <a:t>&lt;</a:t>
             </a:r>
             <a:r>
-              <a:rPr lang="en-US" dirty="0" err="1"/>
+              <a:rPr lang="en-US" sz="1400" dirty="0" err="1">
+                <a:latin typeface="Consolas" panose="020B0609020204030204" pitchFamily="49" charset="0"/>
+                <a:cs typeface="Consolas" panose="020B0609020204030204" pitchFamily="49" charset="0"/>
+              </a:rPr>
               <a:t>int</a:t>
             </a:r>
             <a:r>
-              <a:rPr lang="en-US" dirty="0"/>
+              <a:rPr lang="en-US" sz="1400" dirty="0">
+                <a:latin typeface="Consolas" panose="020B0609020204030204" pitchFamily="49" charset="0"/>
+                <a:cs typeface="Consolas" panose="020B0609020204030204" pitchFamily="49" charset="0"/>
+              </a:rPr>
               <a:t>&gt; DoSomething{ return 5; }</a:t>
             </a:r>
           </a:p>
@@ -3464,11 +3580,13 @@
         <p:spPr>
           <a:xfrm>
             <a:off x="838200" y="1825625"/>
-            <a:ext cx="10515600" cy="1856690"/>
+            <a:ext cx="10515600" cy="4344516"/>
           </a:xfrm>
         </p:spPr>
         <p:txBody>
-          <a:bodyPr/>
+          <a:bodyPr>
+            <a:normAutofit/>
+          </a:bodyPr>
           <a:lstStyle/>
           <a:p>
             <a:r>
@@ -3501,8 +3619,41 @@
               <a:rPr lang="en-US" dirty="0">
                 <a:hlinkClick r:id="rId3"/>
               </a:rPr>
-              <a:t>https://github.com/dotnet/roslyn/wiki/Contributing-Code</a:t>
-            </a:r>
+              <a:t>https://</a:t>
+            </a:r>
+            <a:r>
+              <a:rPr lang="en-US" dirty="0" smtClean="0">
+                <a:hlinkClick r:id="rId3"/>
+              </a:rPr>
+              <a:t>github.com/dotnet/roslyn/wiki/Contributing-Code</a:t>
+            </a:r>
+            <a:endParaRPr lang="en-US" dirty="0" smtClean="0"/>
+          </a:p>
+          <a:p>
+            <a:pPr lvl="1"/>
+            <a:r>
+              <a:rPr lang="en-US" dirty="0" smtClean="0"/>
+              <a:t>Expression-bodied enhancement was a community contribution</a:t>
+            </a:r>
+          </a:p>
+          <a:p>
+            <a:pPr lvl="2"/>
+            <a:r>
+              <a:rPr lang="en-US" dirty="0">
+                <a:hlinkClick r:id="rId4"/>
+              </a:rPr>
+              <a:t>https://blogs.msdn.microsoft.com/dotnet/2016/08/24/whats-new-in-csharp-7-0</a:t>
+            </a:r>
+            <a:r>
+              <a:rPr lang="en-US" dirty="0" smtClean="0">
+                <a:hlinkClick r:id="rId4"/>
+              </a:rPr>
+              <a:t>/</a:t>
+            </a:r>
+            <a:endParaRPr lang="en-US" dirty="0" smtClean="0"/>
+          </a:p>
+          <a:p>
+            <a:pPr lvl="1"/>
             <a:endParaRPr lang="en-US" dirty="0"/>
           </a:p>
           <a:p>
@@ -3558,7 +3709,15 @@
           <a:p>
             <a:r>
               <a:rPr lang="en-US" dirty="0" smtClean="0"/>
-              <a:t>Where to find these sample code</a:t>
+              <a:t>Where to </a:t>
+            </a:r>
+            <a:r>
+              <a:rPr lang="en-US" dirty="0" smtClean="0"/>
+              <a:t>find </a:t>
+            </a:r>
+            <a:r>
+              <a:rPr lang="en-US" dirty="0" smtClean="0"/>
+              <a:t>sample code</a:t>
             </a:r>
             <a:endParaRPr lang="en-US" dirty="0"/>
           </a:p>

</xml_diff>